<commit_message>
fixed notification format in `NominateStoreOwner`
</commit_message>
<xml_diff>
--- a/docs/globalization.pptx
+++ b/docs/globalization.pptx
@@ -8,6 +8,9 @@
     <p:sldId id="256" r:id="rId2"/>
     <p:sldId id="257" r:id="rId3"/>
     <p:sldId id="258" r:id="rId4"/>
+    <p:sldId id="259" r:id="rId5"/>
+    <p:sldId id="260" r:id="rId6"/>
+    <p:sldId id="261" r:id="rId7"/>
   </p:sldIdLst>
   <p:sldSz cx="12192000" cy="6858000"/>
   <p:notesSz cx="6858000" cy="9144000"/>
@@ -106,6 +109,11 @@
       </a:defRPr>
     </a:lvl9pPr>
   </p:defaultTextStyle>
+  <p:extLst>
+    <p:ext uri="{EFAFB233-063F-42B5-8137-9DF3F51BA10A}">
+      <p15:sldGuideLst xmlns:p15="http://schemas.microsoft.com/office/powerpoint/2012/main"/>
+    </p:ext>
+  </p:extLst>
 </p:presentation>
 </file>
 
@@ -256,7 +264,7 @@
           <a:p>
             <a:fld id="{0DF7C241-54C7-4B53-BA8B-9ABC8CD697D5}" type="datetimeFigureOut">
               <a:rPr lang="he-IL" smtClean="0"/>
-              <a:t>כ"ח/סיון/תשפ"ב</a:t>
+              <a:t>כ"ט/סיון/תשפ"ב</a:t>
             </a:fld>
             <a:endParaRPr lang="he-IL"/>
           </a:p>
@@ -454,7 +462,7 @@
           <a:p>
             <a:fld id="{0DF7C241-54C7-4B53-BA8B-9ABC8CD697D5}" type="datetimeFigureOut">
               <a:rPr lang="he-IL" smtClean="0"/>
-              <a:t>כ"ח/סיון/תשפ"ב</a:t>
+              <a:t>כ"ט/סיון/תשפ"ב</a:t>
             </a:fld>
             <a:endParaRPr lang="he-IL"/>
           </a:p>
@@ -662,7 +670,7 @@
           <a:p>
             <a:fld id="{0DF7C241-54C7-4B53-BA8B-9ABC8CD697D5}" type="datetimeFigureOut">
               <a:rPr lang="he-IL" smtClean="0"/>
-              <a:t>כ"ח/סיון/תשפ"ב</a:t>
+              <a:t>כ"ט/סיון/תשפ"ב</a:t>
             </a:fld>
             <a:endParaRPr lang="he-IL"/>
           </a:p>
@@ -860,7 +868,7 @@
           <a:p>
             <a:fld id="{0DF7C241-54C7-4B53-BA8B-9ABC8CD697D5}" type="datetimeFigureOut">
               <a:rPr lang="he-IL" smtClean="0"/>
-              <a:t>כ"ח/סיון/תשפ"ב</a:t>
+              <a:t>כ"ט/סיון/תשפ"ב</a:t>
             </a:fld>
             <a:endParaRPr lang="he-IL"/>
           </a:p>
@@ -1135,7 +1143,7 @@
           <a:p>
             <a:fld id="{0DF7C241-54C7-4B53-BA8B-9ABC8CD697D5}" type="datetimeFigureOut">
               <a:rPr lang="he-IL" smtClean="0"/>
-              <a:t>כ"ח/סיון/תשפ"ב</a:t>
+              <a:t>כ"ט/סיון/תשפ"ב</a:t>
             </a:fld>
             <a:endParaRPr lang="he-IL"/>
           </a:p>
@@ -1400,7 +1408,7 @@
           <a:p>
             <a:fld id="{0DF7C241-54C7-4B53-BA8B-9ABC8CD697D5}" type="datetimeFigureOut">
               <a:rPr lang="he-IL" smtClean="0"/>
-              <a:t>כ"ח/סיון/תשפ"ב</a:t>
+              <a:t>כ"ט/סיון/תשפ"ב</a:t>
             </a:fld>
             <a:endParaRPr lang="he-IL"/>
           </a:p>
@@ -1812,7 +1820,7 @@
           <a:p>
             <a:fld id="{0DF7C241-54C7-4B53-BA8B-9ABC8CD697D5}" type="datetimeFigureOut">
               <a:rPr lang="he-IL" smtClean="0"/>
-              <a:t>כ"ח/סיון/תשפ"ב</a:t>
+              <a:t>כ"ט/סיון/תשפ"ב</a:t>
             </a:fld>
             <a:endParaRPr lang="he-IL"/>
           </a:p>
@@ -1953,7 +1961,7 @@
           <a:p>
             <a:fld id="{0DF7C241-54C7-4B53-BA8B-9ABC8CD697D5}" type="datetimeFigureOut">
               <a:rPr lang="he-IL" smtClean="0"/>
-              <a:t>כ"ח/סיון/תשפ"ב</a:t>
+              <a:t>כ"ט/סיון/תשפ"ב</a:t>
             </a:fld>
             <a:endParaRPr lang="he-IL"/>
           </a:p>
@@ -2066,7 +2074,7 @@
           <a:p>
             <a:fld id="{0DF7C241-54C7-4B53-BA8B-9ABC8CD697D5}" type="datetimeFigureOut">
               <a:rPr lang="he-IL" smtClean="0"/>
-              <a:t>כ"ח/סיון/תשפ"ב</a:t>
+              <a:t>כ"ט/סיון/תשפ"ב</a:t>
             </a:fld>
             <a:endParaRPr lang="he-IL"/>
           </a:p>
@@ -2377,7 +2385,7 @@
           <a:p>
             <a:fld id="{0DF7C241-54C7-4B53-BA8B-9ABC8CD697D5}" type="datetimeFigureOut">
               <a:rPr lang="he-IL" smtClean="0"/>
-              <a:t>כ"ח/סיון/תשפ"ב</a:t>
+              <a:t>כ"ט/סיון/תשפ"ב</a:t>
             </a:fld>
             <a:endParaRPr lang="he-IL"/>
           </a:p>
@@ -2665,7 +2673,7 @@
           <a:p>
             <a:fld id="{0DF7C241-54C7-4B53-BA8B-9ABC8CD697D5}" type="datetimeFigureOut">
               <a:rPr lang="he-IL" smtClean="0"/>
-              <a:t>כ"ח/סיון/תשפ"ב</a:t>
+              <a:t>כ"ט/סיון/תשפ"ב</a:t>
             </a:fld>
             <a:endParaRPr lang="he-IL"/>
           </a:p>
@@ -2906,7 +2914,7 @@
           <a:p>
             <a:fld id="{0DF7C241-54C7-4B53-BA8B-9ABC8CD697D5}" type="datetimeFigureOut">
               <a:rPr lang="he-IL" smtClean="0"/>
-              <a:t>כ"ח/סיון/תשפ"ב</a:t>
+              <a:t>כ"ט/סיון/תשפ"ב</a:t>
             </a:fld>
             <a:endParaRPr lang="he-IL"/>
           </a:p>
@@ -3366,7 +3374,7 @@
                   </a:outerShdw>
                 </a:effectLst>
               </a:rPr>
-              <a:t>סדנה גרסה 4 (ברוך שפטרנו)</a:t>
+              <a:t>סדנה גרסה 4</a:t>
             </a:r>
           </a:p>
           <a:p>
@@ -3415,7 +3423,7 @@
         <p:spPr>
           <a:xfrm>
             <a:off x="1770611" y="5768724"/>
-            <a:ext cx="9168938" cy="923330"/>
+            <a:ext cx="9168938" cy="1015663"/>
           </a:xfrm>
           <a:prstGeom prst="rect">
             <a:avLst/>
@@ -3430,36 +3438,36 @@
           <a:p>
             <a:pPr algn="ctr"/>
             <a:r>
-              <a:rPr lang="he-IL" dirty="0"/>
+              <a:rPr lang="he-IL" sz="2000" dirty="0"/>
               <a:t>ראש גרסה – איתי צרויה</a:t>
             </a:r>
           </a:p>
           <a:p>
             <a:pPr algn="ctr"/>
             <a:r>
-              <a:rPr lang="he-IL" dirty="0"/>
+              <a:rPr lang="he-IL" sz="2000" dirty="0"/>
               <a:t>ראש גרסה חורג – ניר דניאל</a:t>
             </a:r>
           </a:p>
           <a:p>
             <a:pPr algn="ctr"/>
             <a:r>
-              <a:rPr lang="he-IL" dirty="0"/>
+              <a:rPr lang="he-IL" sz="2000" dirty="0"/>
               <a:t>חברי קבוצה יקרים – רון מיכל, איתי </a:t>
             </a:r>
             <a:r>
-              <a:rPr lang="he-IL" dirty="0" err="1"/>
+              <a:rPr lang="he-IL" sz="2000" dirty="0" err="1"/>
               <a:t>גיליוטין</a:t>
             </a:r>
             <a:r>
-              <a:rPr lang="he-IL" dirty="0"/>
+              <a:rPr lang="he-IL" sz="2000" dirty="0"/>
               <a:t>, תומר הלפרין, עומר </a:t>
             </a:r>
             <a:r>
-              <a:rPr lang="he-IL" dirty="0" err="1"/>
+              <a:rPr lang="he-IL" sz="2000" dirty="0" err="1"/>
               <a:t>פרסלר</a:t>
             </a:r>
-            <a:endParaRPr lang="he-IL" dirty="0"/>
+            <a:endParaRPr lang="he-IL" sz="2000" dirty="0"/>
           </a:p>
         </p:txBody>
       </p:sp>
@@ -3833,7 +3841,7 @@
             </a:pPr>
             <a:r>
               <a:rPr lang="en-US" sz="2400" dirty="0"/>
-              <a:t>The process of developing our source code according to international languages.</a:t>
+              <a:t>The process of developing our source code according to international formats.</a:t>
             </a:r>
           </a:p>
           <a:p>
@@ -3843,7 +3851,7 @@
             </a:pPr>
             <a:r>
               <a:rPr lang="en-US" sz="2000" dirty="0"/>
-              <a:t>For example – flexible currency sign, date format, etc.</a:t>
+              <a:t>For example – flexible currency sign, date format, credit card formats, time zones etc.</a:t>
             </a:r>
           </a:p>
           <a:p>
@@ -3863,15 +3871,539 @@
             </a:pPr>
             <a:r>
               <a:rPr lang="en-US" sz="2000" dirty="0"/>
-              <a:t>When developing our software system, we should keep in mind our product will not be used only in English.</a:t>
-            </a:r>
-          </a:p>
-        </p:txBody>
-      </p:sp>
+              <a:t>When developing our software system, we should keep in mind our product will not be used only in English, payment will not only be in dollars, etc.</a:t>
+            </a:r>
+          </a:p>
+        </p:txBody>
+      </p:sp>
+      <p:pic>
+        <p:nvPicPr>
+          <p:cNvPr id="1026" name="Picture 2" descr="How Cultural Differences Shape Your Gratitude">
+            <a:extLst>
+              <a:ext uri="{FF2B5EF4-FFF2-40B4-BE49-F238E27FC236}">
+                <a16:creationId xmlns:a16="http://schemas.microsoft.com/office/drawing/2014/main" id="{29B50555-91E0-E9EB-AC45-742709EC1BE3}"/>
+              </a:ext>
+            </a:extLst>
+          </p:cNvPr>
+          <p:cNvPicPr>
+            <a:picLocks noChangeAspect="1" noChangeArrowheads="1"/>
+          </p:cNvPicPr>
+          <p:nvPr/>
+        </p:nvPicPr>
+        <p:blipFill>
+          <a:blip r:embed="rId2">
+            <a:extLst>
+              <a:ext uri="{28A0092B-C50C-407E-A947-70E740481C1C}">
+                <a14:useLocalDpi xmlns:a14="http://schemas.microsoft.com/office/drawing/2010/main" val="0"/>
+              </a:ext>
+            </a:extLst>
+          </a:blip>
+          <a:srcRect/>
+          <a:stretch>
+            <a:fillRect/>
+          </a:stretch>
+        </p:blipFill>
+        <p:spPr bwMode="auto">
+          <a:xfrm>
+            <a:off x="3738302" y="3429000"/>
+            <a:ext cx="4715395" cy="3112161"/>
+          </a:xfrm>
+          <a:prstGeom prst="rect">
+            <a:avLst/>
+          </a:prstGeom>
+          <a:noFill/>
+          <a:extLst>
+            <a:ext uri="{909E8E84-426E-40DD-AFC4-6F175D3DCCD1}">
+              <a14:hiddenFill xmlns:a14="http://schemas.microsoft.com/office/drawing/2010/main">
+                <a:solidFill>
+                  <a:srgbClr val="FFFFFF"/>
+                </a:solidFill>
+              </a14:hiddenFill>
+            </a:ext>
+          </a:extLst>
+        </p:spPr>
+      </p:pic>
     </p:spTree>
     <p:extLst>
       <p:ext uri="{BB962C8B-B14F-4D97-AF65-F5344CB8AC3E}">
         <p14:creationId xmlns:p14="http://schemas.microsoft.com/office/powerpoint/2010/main" val="532755426"/>
+      </p:ext>
+    </p:extLst>
+  </p:cSld>
+  <p:clrMapOvr>
+    <a:masterClrMapping/>
+  </p:clrMapOvr>
+</p:sld>
+</file>
+
+<file path=ppt/slides/slide4.xml><?xml version="1.0" encoding="utf-8"?>
+<p:sld xmlns:a="http://schemas.openxmlformats.org/drawingml/2006/main" xmlns:r="http://schemas.openxmlformats.org/officeDocument/2006/relationships" xmlns:p="http://schemas.openxmlformats.org/presentationml/2006/main">
+  <p:cSld>
+    <p:spTree>
+      <p:nvGrpSpPr>
+        <p:cNvPr id="1" name=""/>
+        <p:cNvGrpSpPr/>
+        <p:nvPr/>
+      </p:nvGrpSpPr>
+      <p:grpSpPr>
+        <a:xfrm>
+          <a:off x="0" y="0"/>
+          <a:ext cx="0" cy="0"/>
+          <a:chOff x="0" y="0"/>
+          <a:chExt cx="0" cy="0"/>
+        </a:xfrm>
+      </p:grpSpPr>
+      <p:sp>
+        <p:nvSpPr>
+          <p:cNvPr id="4" name="מלבן 3">
+            <a:extLst>
+              <a:ext uri="{FF2B5EF4-FFF2-40B4-BE49-F238E27FC236}">
+                <a16:creationId xmlns:a16="http://schemas.microsoft.com/office/drawing/2014/main" id="{4327A5D2-28D8-3837-21B4-D044EE81D027}"/>
+              </a:ext>
+            </a:extLst>
+          </p:cNvPr>
+          <p:cNvSpPr/>
+          <p:nvPr/>
+        </p:nvSpPr>
+        <p:spPr>
+          <a:xfrm>
+            <a:off x="3343296" y="240760"/>
+            <a:ext cx="5505418" cy="923330"/>
+          </a:xfrm>
+          <a:prstGeom prst="rect">
+            <a:avLst/>
+          </a:prstGeom>
+          <a:noFill/>
+        </p:spPr>
+        <p:txBody>
+          <a:bodyPr wrap="none" lIns="91440" tIns="45720" rIns="91440" bIns="45720">
+            <a:spAutoFit/>
+          </a:bodyPr>
+          <a:lstStyle/>
+          <a:p>
+            <a:pPr algn="ctr" rtl="0"/>
+            <a:r>
+              <a:rPr lang="en-US" sz="5400" b="0" cap="none" spc="0" dirty="0">
+                <a:ln w="0"/>
+                <a:solidFill>
+                  <a:schemeClr val="tx1"/>
+                </a:solidFill>
+                <a:effectLst>
+                  <a:outerShdw blurRad="38100" dist="19050" dir="2700000" algn="tl" rotWithShape="0">
+                    <a:schemeClr val="dk1">
+                      <a:alpha val="40000"/>
+                    </a:schemeClr>
+                  </a:outerShdw>
+                </a:effectLst>
+              </a:rPr>
+              <a:t>Localization (L10N)</a:t>
+            </a:r>
+            <a:endParaRPr lang="he-IL" sz="5400" b="0" cap="none" spc="0" dirty="0">
+              <a:ln w="0"/>
+              <a:solidFill>
+                <a:schemeClr val="tx1"/>
+              </a:solidFill>
+              <a:effectLst>
+                <a:outerShdw blurRad="38100" dist="19050" dir="2700000" algn="tl" rotWithShape="0">
+                  <a:schemeClr val="dk1">
+                    <a:alpha val="40000"/>
+                  </a:schemeClr>
+                </a:outerShdw>
+              </a:effectLst>
+            </a:endParaRPr>
+          </a:p>
+        </p:txBody>
+      </p:sp>
+      <p:sp>
+        <p:nvSpPr>
+          <p:cNvPr id="5" name="תיבת טקסט 4">
+            <a:extLst>
+              <a:ext uri="{FF2B5EF4-FFF2-40B4-BE49-F238E27FC236}">
+                <a16:creationId xmlns:a16="http://schemas.microsoft.com/office/drawing/2014/main" id="{72834DA4-40A0-C0FF-488B-E06B516D3090}"/>
+              </a:ext>
+            </a:extLst>
+          </p:cNvPr>
+          <p:cNvSpPr txBox="1"/>
+          <p:nvPr/>
+        </p:nvSpPr>
+        <p:spPr>
+          <a:xfrm>
+            <a:off x="620162" y="1543779"/>
+            <a:ext cx="10482350" cy="1384995"/>
+          </a:xfrm>
+          <a:prstGeom prst="rect">
+            <a:avLst/>
+          </a:prstGeom>
+          <a:noFill/>
+        </p:spPr>
+        <p:txBody>
+          <a:bodyPr wrap="square" rtlCol="1">
+            <a:spAutoFit/>
+          </a:bodyPr>
+          <a:lstStyle/>
+          <a:p>
+            <a:pPr marL="285750" indent="-285750" algn="l" rtl="0">
+              <a:buFont typeface="Arial" panose="020B0604020202020204" pitchFamily="34" charset="0"/>
+              <a:buChar char="•"/>
+            </a:pPr>
+            <a:r>
+              <a:rPr lang="en-US" sz="2400" dirty="0"/>
+              <a:t>Adapting content to its destination country</a:t>
+            </a:r>
+          </a:p>
+          <a:p>
+            <a:pPr marL="742950" lvl="1" indent="-285750" algn="l" rtl="0">
+              <a:buFont typeface="Arial" panose="020B0604020202020204" pitchFamily="34" charset="0"/>
+              <a:buChar char="•"/>
+            </a:pPr>
+            <a:r>
+              <a:rPr lang="en-US" sz="2000" dirty="0"/>
+              <a:t>For example, replacing polar bear icons with camels for Arab countries</a:t>
+            </a:r>
+          </a:p>
+          <a:p>
+            <a:pPr marL="742950" lvl="1" indent="-285750" algn="l" rtl="0">
+              <a:buFont typeface="Arial" panose="020B0604020202020204" pitchFamily="34" charset="0"/>
+              <a:buChar char="•"/>
+            </a:pPr>
+            <a:r>
+              <a:rPr lang="en-US" sz="2000" dirty="0"/>
+              <a:t>Usually done for video games, movies, software and apps</a:t>
+            </a:r>
+          </a:p>
+          <a:p>
+            <a:pPr marL="742950" lvl="1" indent="-285750" algn="l" rtl="0">
+              <a:buFont typeface="Arial" panose="020B0604020202020204" pitchFamily="34" charset="0"/>
+              <a:buChar char="•"/>
+            </a:pPr>
+            <a:r>
+              <a:rPr lang="en-US" sz="2000" dirty="0"/>
+              <a:t>Make the customers feel like the product was originally designed for their culture!</a:t>
+            </a:r>
+          </a:p>
+        </p:txBody>
+      </p:sp>
+      <p:pic>
+        <p:nvPicPr>
+          <p:cNvPr id="8" name="תמונה 7">
+            <a:extLst>
+              <a:ext uri="{FF2B5EF4-FFF2-40B4-BE49-F238E27FC236}">
+                <a16:creationId xmlns:a16="http://schemas.microsoft.com/office/drawing/2014/main" id="{E0FBDE9F-0694-D855-8BC9-0FD54E7B71AD}"/>
+              </a:ext>
+            </a:extLst>
+          </p:cNvPr>
+          <p:cNvPicPr>
+            <a:picLocks noChangeAspect="1"/>
+          </p:cNvPicPr>
+          <p:nvPr/>
+        </p:nvPicPr>
+        <p:blipFill>
+          <a:blip r:embed="rId2"/>
+          <a:stretch>
+            <a:fillRect/>
+          </a:stretch>
+        </p:blipFill>
+        <p:spPr>
+          <a:xfrm>
+            <a:off x="3046333" y="3308464"/>
+            <a:ext cx="2815004" cy="3308775"/>
+          </a:xfrm>
+          <a:prstGeom prst="rect">
+            <a:avLst/>
+          </a:prstGeom>
+        </p:spPr>
+      </p:pic>
+      <p:pic>
+        <p:nvPicPr>
+          <p:cNvPr id="10" name="תמונה 9">
+            <a:extLst>
+              <a:ext uri="{FF2B5EF4-FFF2-40B4-BE49-F238E27FC236}">
+                <a16:creationId xmlns:a16="http://schemas.microsoft.com/office/drawing/2014/main" id="{4511ACC6-B854-7393-3945-75A2093BD9AF}"/>
+              </a:ext>
+            </a:extLst>
+          </p:cNvPr>
+          <p:cNvPicPr>
+            <a:picLocks noChangeAspect="1"/>
+          </p:cNvPicPr>
+          <p:nvPr/>
+        </p:nvPicPr>
+        <p:blipFill>
+          <a:blip r:embed="rId3"/>
+          <a:stretch>
+            <a:fillRect/>
+          </a:stretch>
+        </p:blipFill>
+        <p:spPr>
+          <a:xfrm>
+            <a:off x="6695901" y="3308464"/>
+            <a:ext cx="2822651" cy="3308775"/>
+          </a:xfrm>
+          <a:prstGeom prst="rect">
+            <a:avLst/>
+          </a:prstGeom>
+        </p:spPr>
+      </p:pic>
+    </p:spTree>
+    <p:extLst>
+      <p:ext uri="{BB962C8B-B14F-4D97-AF65-F5344CB8AC3E}">
+        <p14:creationId xmlns:p14="http://schemas.microsoft.com/office/powerpoint/2010/main" val="3686704188"/>
+      </p:ext>
+    </p:extLst>
+  </p:cSld>
+  <p:clrMapOvr>
+    <a:masterClrMapping/>
+  </p:clrMapOvr>
+</p:sld>
+</file>
+
+<file path=ppt/slides/slide5.xml><?xml version="1.0" encoding="utf-8"?>
+<p:sld xmlns:a="http://schemas.openxmlformats.org/drawingml/2006/main" xmlns:r="http://schemas.openxmlformats.org/officeDocument/2006/relationships" xmlns:p="http://schemas.openxmlformats.org/presentationml/2006/main">
+  <p:cSld>
+    <p:spTree>
+      <p:nvGrpSpPr>
+        <p:cNvPr id="1" name=""/>
+        <p:cNvGrpSpPr/>
+        <p:nvPr/>
+      </p:nvGrpSpPr>
+      <p:grpSpPr>
+        <a:xfrm>
+          <a:off x="0" y="0"/>
+          <a:ext cx="0" cy="0"/>
+          <a:chOff x="0" y="0"/>
+          <a:chExt cx="0" cy="0"/>
+        </a:xfrm>
+      </p:grpSpPr>
+      <p:sp>
+        <p:nvSpPr>
+          <p:cNvPr id="9" name="מלבן 8">
+            <a:extLst>
+              <a:ext uri="{FF2B5EF4-FFF2-40B4-BE49-F238E27FC236}">
+                <a16:creationId xmlns:a16="http://schemas.microsoft.com/office/drawing/2014/main" id="{BFA6C5CE-E794-B027-28CB-C10120DE6585}"/>
+              </a:ext>
+            </a:extLst>
+          </p:cNvPr>
+          <p:cNvSpPr/>
+          <p:nvPr/>
+        </p:nvSpPr>
+        <p:spPr>
+          <a:xfrm>
+            <a:off x="1490939" y="240760"/>
+            <a:ext cx="9210150" cy="923330"/>
+          </a:xfrm>
+          <a:prstGeom prst="rect">
+            <a:avLst/>
+          </a:prstGeom>
+          <a:noFill/>
+        </p:spPr>
+        <p:txBody>
+          <a:bodyPr wrap="none" lIns="91440" tIns="45720" rIns="91440" bIns="45720">
+            <a:spAutoFit/>
+          </a:bodyPr>
+          <a:lstStyle/>
+          <a:p>
+            <a:pPr algn="ctr" rtl="0"/>
+            <a:r>
+              <a:rPr lang="en-US" sz="5400" dirty="0">
+                <a:ln w="0"/>
+                <a:effectLst>
+                  <a:outerShdw blurRad="38100" dist="19050" dir="2700000" algn="tl" rotWithShape="0">
+                    <a:schemeClr val="dk1">
+                      <a:alpha val="40000"/>
+                    </a:schemeClr>
+                  </a:outerShdw>
+                </a:effectLst>
+              </a:rPr>
+              <a:t>Changes Required to our System</a:t>
+            </a:r>
+            <a:endParaRPr lang="he-IL" sz="5400" b="0" cap="none" spc="0" dirty="0">
+              <a:ln w="0"/>
+              <a:solidFill>
+                <a:schemeClr val="tx1"/>
+              </a:solidFill>
+              <a:effectLst>
+                <a:outerShdw blurRad="38100" dist="19050" dir="2700000" algn="tl" rotWithShape="0">
+                  <a:schemeClr val="dk1">
+                    <a:alpha val="40000"/>
+                  </a:schemeClr>
+                </a:outerShdw>
+              </a:effectLst>
+            </a:endParaRPr>
+          </a:p>
+        </p:txBody>
+      </p:sp>
+      <p:sp>
+        <p:nvSpPr>
+          <p:cNvPr id="10" name="תיבת טקסט 9">
+            <a:extLst>
+              <a:ext uri="{FF2B5EF4-FFF2-40B4-BE49-F238E27FC236}">
+                <a16:creationId xmlns:a16="http://schemas.microsoft.com/office/drawing/2014/main" id="{3DF40971-C718-614D-D39D-99350AB09EB7}"/>
+              </a:ext>
+            </a:extLst>
+          </p:cNvPr>
+          <p:cNvSpPr txBox="1"/>
+          <p:nvPr/>
+        </p:nvSpPr>
+        <p:spPr>
+          <a:xfrm>
+            <a:off x="914399" y="1438102"/>
+            <a:ext cx="10482350" cy="2554545"/>
+          </a:xfrm>
+          <a:prstGeom prst="rect">
+            <a:avLst/>
+          </a:prstGeom>
+          <a:noFill/>
+        </p:spPr>
+        <p:txBody>
+          <a:bodyPr wrap="square" rtlCol="1">
+            <a:spAutoFit/>
+          </a:bodyPr>
+          <a:lstStyle/>
+          <a:p>
+            <a:pPr marL="285750" indent="-285750" algn="l" rtl="0">
+              <a:buFont typeface="Arial" panose="020B0604020202020204" pitchFamily="34" charset="0"/>
+              <a:buChar char="•"/>
+            </a:pPr>
+            <a:r>
+              <a:rPr lang="en-US" sz="2000" dirty="0"/>
+              <a:t>Internalization</a:t>
+            </a:r>
+          </a:p>
+          <a:p>
+            <a:pPr marL="742950" lvl="1" indent="-285750" algn="l" rtl="0">
+              <a:buFont typeface="Arial" panose="020B0604020202020204" pitchFamily="34" charset="0"/>
+              <a:buChar char="•"/>
+            </a:pPr>
+            <a:r>
+              <a:rPr lang="en-US" sz="2000" dirty="0"/>
+              <a:t>Including culture specific phrases in other languages (slang phrases etc.)</a:t>
+            </a:r>
+          </a:p>
+          <a:p>
+            <a:pPr marL="742950" lvl="1" indent="-285750" algn="l" rtl="0">
+              <a:buFont typeface="Arial" panose="020B0604020202020204" pitchFamily="34" charset="0"/>
+              <a:buChar char="•"/>
+            </a:pPr>
+            <a:r>
+              <a:rPr lang="en-US" sz="2000" dirty="0"/>
+              <a:t>Supporting additional currencies besides dollars</a:t>
+            </a:r>
+          </a:p>
+          <a:p>
+            <a:pPr marL="742950" lvl="1" indent="-285750" algn="l" rtl="0">
+              <a:buFont typeface="Arial" panose="020B0604020202020204" pitchFamily="34" charset="0"/>
+              <a:buChar char="•"/>
+            </a:pPr>
+            <a:r>
+              <a:rPr lang="en-US" sz="2000" dirty="0"/>
+              <a:t>Adapting messages to time zones (ex.- “Good morning/night” according to location)</a:t>
+            </a:r>
+          </a:p>
+          <a:p>
+            <a:pPr marL="742950" lvl="1" indent="-285750" algn="l" rtl="0">
+              <a:buFont typeface="Arial" panose="020B0604020202020204" pitchFamily="34" charset="0"/>
+              <a:buChar char="•"/>
+            </a:pPr>
+            <a:r>
+              <a:rPr lang="en-US" sz="2000" dirty="0"/>
+              <a:t>Using location services to infer the client’s country and/or culture</a:t>
+            </a:r>
+          </a:p>
+          <a:p>
+            <a:pPr marL="285750" indent="-285750" algn="l" rtl="0">
+              <a:buFont typeface="Arial" panose="020B0604020202020204" pitchFamily="34" charset="0"/>
+              <a:buChar char="•"/>
+            </a:pPr>
+            <a:r>
+              <a:rPr lang="en-US" sz="2000" dirty="0"/>
+              <a:t>Localization</a:t>
+            </a:r>
+          </a:p>
+          <a:p>
+            <a:pPr marL="742950" lvl="1" indent="-285750" algn="l" rtl="0">
+              <a:buFont typeface="Arial" panose="020B0604020202020204" pitchFamily="34" charset="0"/>
+              <a:buChar char="•"/>
+            </a:pPr>
+            <a:r>
+              <a:rPr lang="en-US" sz="2000" dirty="0"/>
+              <a:t>Supporting different product types for various cultures</a:t>
+            </a:r>
+          </a:p>
+          <a:p>
+            <a:pPr marL="742950" lvl="1" indent="-285750" algn="l" rtl="0">
+              <a:buFont typeface="Arial" panose="020B0604020202020204" pitchFamily="34" charset="0"/>
+              <a:buChar char="•"/>
+            </a:pPr>
+            <a:r>
+              <a:rPr lang="en-US" sz="2000" dirty="0"/>
+              <a:t>Personalizing logos and images for different population types</a:t>
+            </a:r>
+          </a:p>
+        </p:txBody>
+      </p:sp>
+      <p:pic>
+        <p:nvPicPr>
+          <p:cNvPr id="13" name="תמונה 12">
+            <a:extLst>
+              <a:ext uri="{FF2B5EF4-FFF2-40B4-BE49-F238E27FC236}">
+                <a16:creationId xmlns:a16="http://schemas.microsoft.com/office/drawing/2014/main" id="{D9C5E924-2604-CBEA-3149-F7EDCB911E83}"/>
+              </a:ext>
+            </a:extLst>
+          </p:cNvPr>
+          <p:cNvPicPr>
+            <a:picLocks noChangeAspect="1"/>
+          </p:cNvPicPr>
+          <p:nvPr/>
+        </p:nvPicPr>
+        <p:blipFill>
+          <a:blip r:embed="rId2"/>
+          <a:stretch>
+            <a:fillRect/>
+          </a:stretch>
+        </p:blipFill>
+        <p:spPr>
+          <a:xfrm>
+            <a:off x="3725571" y="4146099"/>
+            <a:ext cx="4740857" cy="2522013"/>
+          </a:xfrm>
+          <a:prstGeom prst="rect">
+            <a:avLst/>
+          </a:prstGeom>
+        </p:spPr>
+      </p:pic>
+    </p:spTree>
+    <p:extLst>
+      <p:ext uri="{BB962C8B-B14F-4D97-AF65-F5344CB8AC3E}">
+        <p14:creationId xmlns:p14="http://schemas.microsoft.com/office/powerpoint/2010/main" val="1104195384"/>
+      </p:ext>
+    </p:extLst>
+  </p:cSld>
+  <p:clrMapOvr>
+    <a:masterClrMapping/>
+  </p:clrMapOvr>
+</p:sld>
+</file>
+
+<file path=ppt/slides/slide6.xml><?xml version="1.0" encoding="utf-8"?>
+<p:sld xmlns:a="http://schemas.openxmlformats.org/drawingml/2006/main" xmlns:r="http://schemas.openxmlformats.org/officeDocument/2006/relationships" xmlns:p="http://schemas.openxmlformats.org/presentationml/2006/main">
+  <p:cSld>
+    <p:spTree>
+      <p:nvGrpSpPr>
+        <p:cNvPr id="1" name=""/>
+        <p:cNvGrpSpPr/>
+        <p:nvPr/>
+      </p:nvGrpSpPr>
+      <p:grpSpPr>
+        <a:xfrm>
+          <a:off x="0" y="0"/>
+          <a:ext cx="0" cy="0"/>
+          <a:chOff x="0" y="0"/>
+          <a:chExt cx="0" cy="0"/>
+        </a:xfrm>
+      </p:grpSpPr>
+    </p:spTree>
+    <p:extLst>
+      <p:ext uri="{BB962C8B-B14F-4D97-AF65-F5344CB8AC3E}">
+        <p14:creationId xmlns:p14="http://schemas.microsoft.com/office/powerpoint/2010/main" val="1554673032"/>
       </p:ext>
     </p:extLst>
   </p:cSld>

</xml_diff>